<commit_message>
[Modify] : Update detail text on PO part
</commit_message>
<xml_diff>
--- a/ScrumGuide-Thailand-(Draft-TeamC)-20181006.pptx
+++ b/ScrumGuide-Thailand-(Draft-TeamC)-20181006.pptx
@@ -3722,8 +3722,8 @@
         </p:nvSpPr>
         <p:spPr>
           <a:xfrm>
-            <a:off x="4572000" y="1828800"/>
-            <a:ext cx="6765993" cy="4524315"/>
+            <a:off x="4094018" y="1787236"/>
+            <a:ext cx="7620000" cy="4524315"/>
           </a:xfrm>
           <a:prstGeom prst="rect">
             <a:avLst/>
@@ -3839,7 +3839,7 @@
                 <a:latin typeface="Arial" panose="020B0604020202020204" pitchFamily="34" charset="0"/>
                 <a:cs typeface="Arial" panose="020B0604020202020204" pitchFamily="34" charset="0"/>
               </a:rPr>
-              <a:t>Optimizing the value of the work</a:t>
+              <a:t>Optimizing the value of the work the Development Team performs</a:t>
             </a:r>
           </a:p>
           <a:p>
@@ -3888,7 +3888,7 @@
                 <a:latin typeface="Arial" panose="020B0604020202020204" pitchFamily="34" charset="0"/>
                 <a:cs typeface="Arial" panose="020B0604020202020204" pitchFamily="34" charset="0"/>
               </a:rPr>
-              <a:t>Respect his or her decisions</a:t>
+              <a:t>The entire organization must respect his or her decisions</a:t>
             </a:r>
           </a:p>
           <a:p>
@@ -3911,7 +3911,7 @@
                 <a:latin typeface="Arial" panose="020B0604020202020204" pitchFamily="34" charset="0"/>
                 <a:cs typeface="Arial" panose="020B0604020202020204" pitchFamily="34" charset="0"/>
               </a:rPr>
-              <a:t>No one can force the Development Team to work from a different set of requirements</a:t>
+              <a:t>No one can force the Development Team to work from a different set of requirements, Except the product owner</a:t>
             </a:r>
           </a:p>
         </p:txBody>

</xml_diff>